<commit_message>
Phrasing and grammar changes
</commit_message>
<xml_diff>
--- a/Documentation/Presentations/CS499_16Sp_Poster_Hotspotter.pptx
+++ b/Documentation/Presentations/CS499_16Sp_Poster_Hotspotter.pptx
@@ -168,7 +168,6 @@
               <a:rPr lang="en-US"/>
               <a:t>Click to edit Master title style</a:t>
             </a:r>
-            <a:endParaRPr lang="en-US"/>
           </a:p>
         </p:txBody>
       </p:sp>
@@ -233,7 +232,6 @@
               <a:rPr lang="en-US"/>
               <a:t>Click to edit Master subtitle style</a:t>
             </a:r>
-            <a:endParaRPr lang="en-US"/>
           </a:p>
         </p:txBody>
       </p:sp>
@@ -353,7 +351,6 @@
               <a:rPr lang="en-US"/>
               <a:t>Click to edit Master title style</a:t>
             </a:r>
-            <a:endParaRPr lang="en-US"/>
           </a:p>
         </p:txBody>
       </p:sp>
@@ -405,7 +402,6 @@
               <a:rPr lang="en-US"/>
               <a:t>Fifth level</a:t>
             </a:r>
-            <a:endParaRPr lang="en-US"/>
           </a:p>
         </p:txBody>
       </p:sp>
@@ -530,7 +526,6 @@
               <a:rPr lang="en-US"/>
               <a:t>Click to edit Master title style</a:t>
             </a:r>
-            <a:endParaRPr lang="en-US"/>
           </a:p>
         </p:txBody>
       </p:sp>
@@ -587,7 +582,6 @@
               <a:rPr lang="en-US"/>
               <a:t>Fifth level</a:t>
             </a:r>
-            <a:endParaRPr lang="en-US"/>
           </a:p>
         </p:txBody>
       </p:sp>
@@ -1120,7 +1114,6 @@
               <a:rPr lang="en-US"/>
               <a:t>Click to edit Master title style</a:t>
             </a:r>
-            <a:endParaRPr lang="en-US"/>
           </a:p>
         </p:txBody>
       </p:sp>
@@ -1172,7 +1165,6 @@
               <a:rPr lang="en-US"/>
               <a:t>Fifth level</a:t>
             </a:r>
-            <a:endParaRPr lang="en-US"/>
           </a:p>
         </p:txBody>
       </p:sp>
@@ -1301,7 +1293,6 @@
               <a:rPr lang="en-US"/>
               <a:t>Click to edit Master title style</a:t>
             </a:r>
-            <a:endParaRPr lang="en-US"/>
           </a:p>
         </p:txBody>
       </p:sp>
@@ -1540,7 +1531,6 @@
               <a:rPr lang="en-US"/>
               <a:t>Click to edit Master title style</a:t>
             </a:r>
-            <a:endParaRPr lang="en-US"/>
           </a:p>
         </p:txBody>
       </p:sp>
@@ -1597,7 +1587,6 @@
               <a:rPr lang="en-US"/>
               <a:t>Fifth level</a:t>
             </a:r>
-            <a:endParaRPr lang="en-US"/>
           </a:p>
         </p:txBody>
       </p:sp>
@@ -1654,7 +1643,6 @@
               <a:rPr lang="en-US"/>
               <a:t>Fifth level</a:t>
             </a:r>
-            <a:endParaRPr lang="en-US"/>
           </a:p>
         </p:txBody>
       </p:sp>
@@ -1779,7 +1767,6 @@
               <a:rPr lang="en-US"/>
               <a:t>Click to edit Master title style</a:t>
             </a:r>
-            <a:endParaRPr lang="en-US"/>
           </a:p>
         </p:txBody>
       </p:sp>
@@ -1901,7 +1888,6 @@
               <a:rPr lang="en-US"/>
               <a:t>Fifth level</a:t>
             </a:r>
-            <a:endParaRPr lang="en-US"/>
           </a:p>
         </p:txBody>
       </p:sp>
@@ -2023,7 +2009,6 @@
               <a:rPr lang="en-US"/>
               <a:t>Fifth level</a:t>
             </a:r>
-            <a:endParaRPr lang="en-US"/>
           </a:p>
         </p:txBody>
       </p:sp>
@@ -2143,7 +2128,6 @@
               <a:rPr lang="en-US"/>
               <a:t>Click to edit Master title style</a:t>
             </a:r>
-            <a:endParaRPr lang="en-US"/>
           </a:p>
         </p:txBody>
       </p:sp>
@@ -2369,7 +2353,6 @@
               <a:rPr lang="en-US"/>
               <a:t>Click to edit Master title style</a:t>
             </a:r>
-            <a:endParaRPr lang="en-US"/>
           </a:p>
         </p:txBody>
       </p:sp>
@@ -2454,7 +2437,6 @@
               <a:rPr lang="en-US"/>
               <a:t>Fifth level</a:t>
             </a:r>
-            <a:endParaRPr lang="en-US"/>
           </a:p>
         </p:txBody>
       </p:sp>
@@ -2648,7 +2630,6 @@
               <a:rPr lang="en-US"/>
               <a:t>Click to edit Master title style</a:t>
             </a:r>
-            <a:endParaRPr lang="en-US"/>
           </a:p>
         </p:txBody>
       </p:sp>
@@ -2909,7 +2890,6 @@
               <a:rPr lang="en-US"/>
               <a:t>Click to edit Master title style</a:t>
             </a:r>
-            <a:endParaRPr lang="en-US"/>
           </a:p>
         </p:txBody>
       </p:sp>
@@ -2971,7 +2951,6 @@
               <a:rPr lang="en-US"/>
               <a:t>Fifth level</a:t>
             </a:r>
-            <a:endParaRPr lang="en-US"/>
           </a:p>
         </p:txBody>
       </p:sp>
@@ -3484,12 +3463,17 @@
           <a:p>
             <a:r>
               <a:rPr lang="en-US" sz="4100" b="0" dirty="0"/>
-              <a:t>This is accomplished by detecting areas of instability called 'hotspots'. Hotspots are determined by analyzing the type and frequency of changes made to the project's repository.</a:t>
-            </a:r>
-          </a:p>
-          <a:p>
-            <a:r>
-              <a:rPr lang="en-US" sz="4100" b="0" dirty="0"/>
+              <a:t>This is accomplished by detecting areas of instability called 'hotspots'. Hotspots are determined by analyzing the type and frequency of changes made to </a:t>
+            </a:r>
+            <a:r>
+              <a:rPr lang="en-US" sz="4100" b="0" dirty="0" smtClean="0"/>
+              <a:t>a project's codebase.</a:t>
+            </a:r>
+            <a:endParaRPr lang="en-US" sz="4100" b="0" dirty="0"/>
+          </a:p>
+          <a:p>
+            <a:r>
+              <a:rPr lang="en-US" sz="4100" dirty="0"/>
               <a:t>Objectives</a:t>
             </a:r>
           </a:p>
@@ -3502,9 +3486,22 @@
               <a:buChar char="•"/>
             </a:pPr>
             <a:r>
+              <a:rPr lang="en-US" sz="4100" b="0" dirty="0" smtClean="0"/>
+              <a:t>Calculate probability of</a:t>
+            </a:r>
+            <a:r>
+              <a:rPr lang="en-US" sz="4100" b="0" dirty="0" smtClean="0"/>
+              <a:t> </a:t>
+            </a:r>
+            <a:r>
               <a:rPr lang="en-US" sz="4100" b="0" dirty="0"/>
-              <a:t>Give predictions of problematic areas of code.</a:t>
-            </a:r>
+              <a:t>problematic areas </a:t>
+            </a:r>
+            <a:r>
+              <a:rPr lang="en-US" sz="4100" b="0" dirty="0" smtClean="0"/>
+              <a:t>in code</a:t>
+            </a:r>
+            <a:endParaRPr lang="en-US" sz="4100" b="0" dirty="0"/>
           </a:p>
           <a:p>
             <a:pPr marL="571212" indent="-571212">
@@ -3515,8 +3512,8 @@
               <a:buChar char="•"/>
             </a:pPr>
             <a:r>
-              <a:rPr lang="en-US" sz="4100" b="0" dirty="0"/>
-              <a:t>Repository quality improvements.</a:t>
+              <a:rPr lang="en-US" sz="4100" b="0" dirty="0" smtClean="0"/>
+              <a:t>Assist teams with quality control and assurance</a:t>
             </a:r>
           </a:p>
           <a:p>
@@ -3528,9 +3525,10 @@
               <a:buChar char="•"/>
             </a:pPr>
             <a:r>
-              <a:rPr lang="en-US" sz="4100" b="0" dirty="0"/>
-              <a:t>Repository metadata scanner for future analyzing.</a:t>
-            </a:r>
+              <a:rPr lang="en-US" sz="4100" b="0" dirty="0" smtClean="0"/>
+              <a:t>Export repository metadata for future research and analysis</a:t>
+            </a:r>
+            <a:endParaRPr lang="en-US" sz="4100" b="0" dirty="0"/>
           </a:p>
           <a:p>
             <a:endParaRPr lang="en-US" sz="5100" dirty="0"/>
@@ -3559,48 +3557,69 @@
           <a:p>
             <a:r>
               <a:rPr lang="en-US" b="1" dirty="0"/>
-              <a:t>Nate Reinhardt</a:t>
-            </a:r>
-            <a:r>
-              <a:rPr lang="en-US" dirty="0"/>
-              <a:t>-</a:t>
-            </a:r>
-            <a:r>
-              <a:rPr lang="en-US" i="1" dirty="0"/>
-              <a:t>SM</a:t>
+              <a:t>Nate </a:t>
+            </a:r>
+            <a:r>
+              <a:rPr lang="en-US" b="1" dirty="0" smtClean="0"/>
+              <a:t>Reinhardt</a:t>
             </a:r>
             <a:r>
               <a:rPr lang="en-US" dirty="0"/>
               <a:t> </a:t>
             </a:r>
             <a:r>
+              <a:rPr lang="en-US" sz="3600" dirty="0" smtClean="0"/>
+              <a:t>(</a:t>
+            </a:r>
+            <a:r>
+              <a:rPr lang="en-US" sz="3600" dirty="0" smtClean="0"/>
+              <a:t>SM)</a:t>
+            </a:r>
+            <a:r>
+              <a:rPr lang="en-US" dirty="0" smtClean="0"/>
+              <a:t> </a:t>
+            </a:r>
+            <a:r>
               <a:rPr lang="en-US" b="1" dirty="0"/>
-              <a:t>Spencer Smith</a:t>
-            </a:r>
-            <a:r>
-              <a:rPr lang="en-US" dirty="0"/>
-              <a:t>-</a:t>
-            </a:r>
-            <a:r>
-              <a:rPr lang="en-US" i="1" dirty="0"/>
-              <a:t>OP</a:t>
+              <a:t>Spencer </a:t>
+            </a:r>
+            <a:r>
+              <a:rPr lang="en-US" b="1" dirty="0" smtClean="0"/>
+              <a:t>Smith</a:t>
             </a:r>
             <a:r>
               <a:rPr lang="en-US" dirty="0"/>
               <a:t> </a:t>
             </a:r>
             <a:r>
+              <a:rPr lang="en-US" sz="3600" dirty="0" smtClean="0"/>
+              <a:t>(</a:t>
+            </a:r>
+            <a:r>
+              <a:rPr lang="en-US" sz="3600" dirty="0" smtClean="0"/>
+              <a:t>OP) </a:t>
+            </a:r>
+            <a:r>
               <a:rPr lang="en-US" b="1" dirty="0"/>
-              <a:t>Dylan Williams</a:t>
+              <a:t>Dylan </a:t>
+            </a:r>
+            <a:r>
+              <a:rPr lang="en-US" b="1" dirty="0" smtClean="0"/>
+              <a:t>Williams</a:t>
             </a:r>
             <a:r>
               <a:rPr lang="en-US" dirty="0"/>
-              <a:t>-</a:t>
-            </a:r>
-            <a:r>
-              <a:rPr lang="en-US" i="1" dirty="0"/>
-              <a:t>QC</a:t>
-            </a:r>
+              <a:t> </a:t>
+            </a:r>
+            <a:r>
+              <a:rPr lang="en-US" sz="3600" dirty="0" smtClean="0"/>
+              <a:t>(</a:t>
+            </a:r>
+            <a:r>
+              <a:rPr lang="en-US" sz="3600" dirty="0" smtClean="0"/>
+              <a:t>QC)</a:t>
+            </a:r>
+            <a:endParaRPr lang="en-US" dirty="0"/>
           </a:p>
         </p:txBody>
       </p:sp>
@@ -3629,12 +3648,20 @@
               <a:t>Dr. Igor </a:t>
             </a:r>
             <a:r>
-              <a:rPr lang="en-US" b="1" dirty="0" err="1"/>
+              <a:rPr lang="en-US" b="1" dirty="0" smtClean="0"/>
               <a:t>Crk</a:t>
             </a:r>
             <a:r>
               <a:rPr lang="en-US" dirty="0"/>
-              <a:t>: Department of Computer Science</a:t>
+              <a:t>,</a:t>
+            </a:r>
+            <a:r>
+              <a:rPr lang="en-US" dirty="0" smtClean="0"/>
+              <a:t> </a:t>
+            </a:r>
+            <a:r>
+              <a:rPr lang="en-US" dirty="0"/>
+              <a:t>Department of Computer Science</a:t>
             </a:r>
           </a:p>
         </p:txBody>
@@ -3660,14 +3687,24 @@
             <a:normAutofit/>
           </a:bodyPr>
           <a:lstStyle/>
+          <a:p>
+            <a:r>
+              <a:rPr lang="en-US" sz="4400" dirty="0" smtClean="0"/>
+              <a:t>Plan</a:t>
+            </a:r>
+          </a:p>
           <a:p>
             <a:pPr marL="856823" indent="-856823">
               <a:buFont typeface="Arial" panose="020B0604020202020204" pitchFamily="34" charset="0"/>
               <a:buChar char="•"/>
             </a:pPr>
             <a:r>
+              <a:rPr lang="en-US" sz="4500" dirty="0" smtClean="0"/>
+              <a:t>Using </a:t>
+            </a:r>
+            <a:r>
               <a:rPr lang="en-US" sz="4500" dirty="0"/>
-              <a:t>Using the Semi-Agile Software Engineering (SAGE) process, a Scrum-like process with ten two-week sprints.</a:t>
+              <a:t>the Semi-Agile Software Engineering (SAGE) process, a Scrum-like process with ten two-week sprints.</a:t>
             </a:r>
           </a:p>
           <a:p>
@@ -3677,7 +3714,15 @@
             </a:pPr>
             <a:r>
               <a:rPr lang="en-US" sz="4500" dirty="0"/>
-              <a:t>Development Operations: Automated build and deploying mechanisms.</a:t>
+              <a:t>Development Operations: Automated build and </a:t>
+            </a:r>
+            <a:r>
+              <a:rPr lang="en-US" sz="4500" dirty="0" smtClean="0"/>
+              <a:t>deployment </a:t>
+            </a:r>
+            <a:r>
+              <a:rPr lang="en-US" sz="4500" dirty="0"/>
+              <a:t>mechanisms.</a:t>
             </a:r>
           </a:p>
           <a:p>
@@ -3714,8 +3759,8 @@
         </p:nvSpPr>
         <p:spPr>
           <a:xfrm>
-            <a:off x="15163800" y="6629398"/>
-            <a:ext cx="14782800" cy="6934202"/>
+            <a:off x="15163800" y="6324603"/>
+            <a:ext cx="15087600" cy="6934202"/>
           </a:xfrm>
         </p:spPr>
         <p:txBody>
@@ -3730,26 +3775,20 @@
             </a:r>
             <a:r>
               <a:rPr lang="en-US" sz="4800" dirty="0"/>
-              <a:t> is a full web application built with the MEAN stack. Which uses a client/server architecture with </a:t>
-            </a:r>
-            <a:r>
-              <a:rPr lang="en-US" sz="4800" dirty="0" err="1"/>
-              <a:t>MongoDB</a:t>
+              <a:t> </a:t>
+            </a:r>
+            <a:r>
+              <a:rPr lang="en-US" sz="4800" dirty="0" smtClean="0"/>
+              <a:t>is built with the </a:t>
             </a:r>
             <a:r>
               <a:rPr lang="en-US" sz="4800" dirty="0"/>
-              <a:t> as its </a:t>
-            </a:r>
-            <a:r>
-              <a:rPr lang="en-US" sz="4800" dirty="0" err="1"/>
-              <a:t>datastore</a:t>
-            </a:r>
-            <a:r>
-              <a:rPr lang="en-US" sz="4800" dirty="0"/>
-              <a:t>. </a:t>
-            </a:r>
-          </a:p>
-          <a:p>
+              <a:t>MEAN </a:t>
+            </a:r>
+            <a:r>
+              <a:rPr lang="en-US" sz="4800" dirty="0" smtClean="0"/>
+              <a:t>stack and utilizes a client/server architecture with an emphasis on modularity.</a:t>
+            </a:r>
             <a:endParaRPr lang="en-US" sz="5500" dirty="0"/>
           </a:p>
           <a:p>
@@ -3788,36 +3827,6 @@
                 </a:solidFill>
               </a:rPr>
               <a:t>Temporary Logo</a:t>
-            </a:r>
-          </a:p>
-        </p:txBody>
-      </p:sp>
-      <p:sp>
-        <p:nvSpPr>
-          <p:cNvPr id="4" name="TextBox 3"/>
-          <p:cNvSpPr txBox="1"/>
-          <p:nvPr/>
-        </p:nvSpPr>
-        <p:spPr>
-          <a:xfrm>
-            <a:off x="17407156" y="18295248"/>
-            <a:ext cx="10515600" cy="830952"/>
-          </a:xfrm>
-          <a:prstGeom prst="rect">
-            <a:avLst/>
-          </a:prstGeom>
-          <a:noFill/>
-        </p:spPr>
-        <p:txBody>
-          <a:bodyPr wrap="square" lIns="91394" tIns="45698" rIns="91394" bIns="45698" rtlCol="0">
-            <a:spAutoFit/>
-          </a:bodyPr>
-          <a:lstStyle/>
-          <a:p>
-            <a:pPr algn="ctr"/>
-            <a:r>
-              <a:rPr lang="en-US" sz="4800" dirty="0"/>
-              <a:t>The MEAN Tech Stack</a:t>
             </a:r>
           </a:p>
         </p:txBody>

</xml_diff>

<commit_message>
Fixed estimated project hours
</commit_message>
<xml_diff>
--- a/Documentation/Presentations/CS499_16Sp_Poster_Hotspotter.pptx
+++ b/Documentation/Presentations/CS499_16Sp_Poster_Hotspotter.pptx
@@ -253,7 +253,7 @@
             <a:fld id="{1D8BD707-D9CF-40AE-B4C6-C98DA3205C09}" type="datetimeFigureOut">
               <a:rPr lang="en-US" smtClean="0"/>
               <a:pPr/>
-              <a:t>3/30/2016</a:t>
+              <a:t>3/31/2016</a:t>
             </a:fld>
             <a:endParaRPr lang="en-US"/>
           </a:p>
@@ -423,7 +423,7 @@
             <a:fld id="{1D8BD707-D9CF-40AE-B4C6-C98DA3205C09}" type="datetimeFigureOut">
               <a:rPr lang="en-US" smtClean="0"/>
               <a:pPr/>
-              <a:t>3/30/2016</a:t>
+              <a:t>3/31/2016</a:t>
             </a:fld>
             <a:endParaRPr lang="en-US"/>
           </a:p>
@@ -603,7 +603,7 @@
             <a:fld id="{1D8BD707-D9CF-40AE-B4C6-C98DA3205C09}" type="datetimeFigureOut">
               <a:rPr lang="en-US" smtClean="0"/>
               <a:pPr/>
-              <a:t>3/30/2016</a:t>
+              <a:t>3/31/2016</a:t>
             </a:fld>
             <a:endParaRPr lang="en-US"/>
           </a:p>
@@ -1186,7 +1186,7 @@
             <a:fld id="{1D8BD707-D9CF-40AE-B4C6-C98DA3205C09}" type="datetimeFigureOut">
               <a:rPr lang="en-US" smtClean="0"/>
               <a:pPr/>
-              <a:t>3/30/2016</a:t>
+              <a:t>3/31/2016</a:t>
             </a:fld>
             <a:endParaRPr lang="en-US"/>
           </a:p>
@@ -1433,7 +1433,7 @@
             <a:fld id="{1D8BD707-D9CF-40AE-B4C6-C98DA3205C09}" type="datetimeFigureOut">
               <a:rPr lang="en-US" smtClean="0"/>
               <a:pPr/>
-              <a:t>3/30/2016</a:t>
+              <a:t>3/31/2016</a:t>
             </a:fld>
             <a:endParaRPr lang="en-US"/>
           </a:p>
@@ -1664,7 +1664,7 @@
             <a:fld id="{1D8BD707-D9CF-40AE-B4C6-C98DA3205C09}" type="datetimeFigureOut">
               <a:rPr lang="en-US" smtClean="0"/>
               <a:pPr/>
-              <a:t>3/30/2016</a:t>
+              <a:t>3/31/2016</a:t>
             </a:fld>
             <a:endParaRPr lang="en-US"/>
           </a:p>
@@ -2030,7 +2030,7 @@
             <a:fld id="{1D8BD707-D9CF-40AE-B4C6-C98DA3205C09}" type="datetimeFigureOut">
               <a:rPr lang="en-US" smtClean="0"/>
               <a:pPr/>
-              <a:t>3/30/2016</a:t>
+              <a:t>3/31/2016</a:t>
             </a:fld>
             <a:endParaRPr lang="en-US"/>
           </a:p>
@@ -2149,7 +2149,7 @@
             <a:fld id="{1D8BD707-D9CF-40AE-B4C6-C98DA3205C09}" type="datetimeFigureOut">
               <a:rPr lang="en-US" smtClean="0"/>
               <a:pPr/>
-              <a:t>3/30/2016</a:t>
+              <a:t>3/31/2016</a:t>
             </a:fld>
             <a:endParaRPr lang="en-US"/>
           </a:p>
@@ -2246,7 +2246,7 @@
             <a:fld id="{1D8BD707-D9CF-40AE-B4C6-C98DA3205C09}" type="datetimeFigureOut">
               <a:rPr lang="en-US" smtClean="0"/>
               <a:pPr/>
-              <a:t>3/30/2016</a:t>
+              <a:t>3/31/2016</a:t>
             </a:fld>
             <a:endParaRPr lang="en-US"/>
           </a:p>
@@ -2523,7 +2523,7 @@
             <a:fld id="{1D8BD707-D9CF-40AE-B4C6-C98DA3205C09}" type="datetimeFigureOut">
               <a:rPr lang="en-US" smtClean="0"/>
               <a:pPr/>
-              <a:t>3/30/2016</a:t>
+              <a:t>3/31/2016</a:t>
             </a:fld>
             <a:endParaRPr lang="en-US"/>
           </a:p>
@@ -2777,7 +2777,7 @@
             <a:fld id="{1D8BD707-D9CF-40AE-B4C6-C98DA3205C09}" type="datetimeFigureOut">
               <a:rPr lang="en-US" smtClean="0"/>
               <a:pPr/>
-              <a:t>3/30/2016</a:t>
+              <a:t>3/31/2016</a:t>
             </a:fld>
             <a:endParaRPr lang="en-US"/>
           </a:p>
@@ -2990,7 +2990,7 @@
             <a:fld id="{1D8BD707-D9CF-40AE-B4C6-C98DA3205C09}" type="datetimeFigureOut">
               <a:rPr lang="en-US" smtClean="0"/>
               <a:pPr/>
-              <a:t>3/30/2016</a:t>
+              <a:t>3/31/2016</a:t>
             </a:fld>
             <a:endParaRPr lang="en-US"/>
           </a:p>
@@ -3666,8 +3666,17 @@
             </a:pPr>
             <a:r>
               <a:rPr lang="en-US" sz="4500" b="0" dirty="0"/>
-              <a:t>Total Estimated Hours Until Completion: 23</a:t>
-            </a:r>
+              <a:t>Total Estimated Hours Until Completion</a:t>
+            </a:r>
+            <a:r>
+              <a:rPr lang="en-US" sz="4500" b="0"/>
+              <a:t>: </a:t>
+            </a:r>
+            <a:r>
+              <a:rPr lang="en-US" sz="4500" b="0" smtClean="0"/>
+              <a:t>416</a:t>
+            </a:r>
+            <a:endParaRPr lang="en-US" sz="4500" b="0" dirty="0"/>
           </a:p>
           <a:p>
             <a:endParaRPr lang="en-US" sz="4500" dirty="0"/>

</xml_diff>

<commit_message>
Added scoring section, adjusted spacing, added interface screenshot
</commit_message>
<xml_diff>
--- a/Documentation/Presentations/CS499_16Sp_Poster_Hotspotter.pptx
+++ b/Documentation/Presentations/CS499_16Sp_Poster_Hotspotter.pptx
@@ -4,6 +4,9 @@
   <p:sldMasterIdLst>
     <p:sldMasterId id="2147483825" r:id="rId1"/>
   </p:sldMasterIdLst>
+  <p:notesMasterIdLst>
+    <p:notesMasterId r:id="rId3"/>
+  </p:notesMasterIdLst>
   <p:sldIdLst>
     <p:sldId id="256" r:id="rId2"/>
   </p:sldIdLst>
@@ -123,6 +126,356 @@
 </p:presentation>
 </file>
 
+<file path=ppt/notesMasters/notesMaster1.xml><?xml version="1.0" encoding="utf-8"?>
+<p:notesMaster xmlns:a="http://schemas.openxmlformats.org/drawingml/2006/main" xmlns:r="http://schemas.openxmlformats.org/officeDocument/2006/relationships" xmlns:p="http://schemas.openxmlformats.org/presentationml/2006/main">
+  <p:cSld>
+    <p:bg>
+      <p:bgRef idx="1001">
+        <a:schemeClr val="bg1"/>
+      </p:bgRef>
+    </p:bg>
+    <p:spTree>
+      <p:nvGrpSpPr>
+        <p:cNvPr id="1" name=""/>
+        <p:cNvGrpSpPr/>
+        <p:nvPr/>
+      </p:nvGrpSpPr>
+      <p:grpSpPr>
+        <a:xfrm>
+          <a:off x="0" y="0"/>
+          <a:ext cx="0" cy="0"/>
+          <a:chOff x="0" y="0"/>
+          <a:chExt cx="0" cy="0"/>
+        </a:xfrm>
+      </p:grpSpPr>
+      <p:sp>
+        <p:nvSpPr>
+          <p:cNvPr id="2" name="Header Placeholder 1"/>
+          <p:cNvSpPr>
+            <a:spLocks noGrp="1"/>
+          </p:cNvSpPr>
+          <p:nvPr>
+            <p:ph type="hdr" sz="quarter"/>
+          </p:nvPr>
+        </p:nvSpPr>
+        <p:spPr>
+          <a:xfrm>
+            <a:off x="0" y="0"/>
+            <a:ext cx="2971800" cy="458788"/>
+          </a:xfrm>
+          <a:prstGeom prst="rect">
+            <a:avLst/>
+          </a:prstGeom>
+        </p:spPr>
+        <p:txBody>
+          <a:bodyPr vert="horz" lIns="91440" tIns="45720" rIns="91440" bIns="45720" rtlCol="0"/>
+          <a:lstStyle>
+            <a:lvl1pPr algn="l">
+              <a:defRPr sz="1200"/>
+            </a:lvl1pPr>
+          </a:lstStyle>
+          <a:p>
+            <a:endParaRPr lang="en-US"/>
+          </a:p>
+        </p:txBody>
+      </p:sp>
+      <p:sp>
+        <p:nvSpPr>
+          <p:cNvPr id="3" name="Date Placeholder 2"/>
+          <p:cNvSpPr>
+            <a:spLocks noGrp="1"/>
+          </p:cNvSpPr>
+          <p:nvPr>
+            <p:ph type="dt" idx="1"/>
+          </p:nvPr>
+        </p:nvSpPr>
+        <p:spPr>
+          <a:xfrm>
+            <a:off x="3884613" y="0"/>
+            <a:ext cx="2971800" cy="458788"/>
+          </a:xfrm>
+          <a:prstGeom prst="rect">
+            <a:avLst/>
+          </a:prstGeom>
+        </p:spPr>
+        <p:txBody>
+          <a:bodyPr vert="horz" lIns="91440" tIns="45720" rIns="91440" bIns="45720" rtlCol="0"/>
+          <a:lstStyle>
+            <a:lvl1pPr algn="r">
+              <a:defRPr sz="1200"/>
+            </a:lvl1pPr>
+          </a:lstStyle>
+          <a:p>
+            <a:fld id="{9DAE759B-826F-4A01-A55A-A5FDDBCD6FC0}" type="datetimeFigureOut">
+              <a:rPr lang="en-US" smtClean="0"/>
+              <a:t>4/27/2016</a:t>
+            </a:fld>
+            <a:endParaRPr lang="en-US"/>
+          </a:p>
+        </p:txBody>
+      </p:sp>
+      <p:sp>
+        <p:nvSpPr>
+          <p:cNvPr id="4" name="Slide Image Placeholder 3"/>
+          <p:cNvSpPr>
+            <a:spLocks noGrp="1" noRot="1" noChangeAspect="1"/>
+          </p:cNvSpPr>
+          <p:nvPr>
+            <p:ph type="sldImg" idx="2"/>
+          </p:nvPr>
+        </p:nvSpPr>
+        <p:spPr>
+          <a:xfrm>
+            <a:off x="1114425" y="1143000"/>
+            <a:ext cx="4629150" cy="3086100"/>
+          </a:xfrm>
+          <a:prstGeom prst="rect">
+            <a:avLst/>
+          </a:prstGeom>
+          <a:noFill/>
+          <a:ln w="12700">
+            <a:solidFill>
+              <a:prstClr val="black"/>
+            </a:solidFill>
+          </a:ln>
+        </p:spPr>
+        <p:txBody>
+          <a:bodyPr vert="horz" lIns="91440" tIns="45720" rIns="91440" bIns="45720" rtlCol="0" anchor="ctr"/>
+          <a:lstStyle/>
+          <a:p>
+            <a:endParaRPr lang="en-US"/>
+          </a:p>
+        </p:txBody>
+      </p:sp>
+      <p:sp>
+        <p:nvSpPr>
+          <p:cNvPr id="5" name="Notes Placeholder 4"/>
+          <p:cNvSpPr>
+            <a:spLocks noGrp="1"/>
+          </p:cNvSpPr>
+          <p:nvPr>
+            <p:ph type="body" sz="quarter" idx="3"/>
+          </p:nvPr>
+        </p:nvSpPr>
+        <p:spPr>
+          <a:xfrm>
+            <a:off x="685800" y="4400550"/>
+            <a:ext cx="5486400" cy="3600450"/>
+          </a:xfrm>
+          <a:prstGeom prst="rect">
+            <a:avLst/>
+          </a:prstGeom>
+        </p:spPr>
+        <p:txBody>
+          <a:bodyPr vert="horz" lIns="91440" tIns="45720" rIns="91440" bIns="45720" rtlCol="0"/>
+          <a:lstStyle/>
+          <a:p>
+            <a:pPr lvl="0"/>
+            <a:r>
+              <a:rPr lang="en-US" smtClean="0"/>
+              <a:t>Click to edit Master text styles</a:t>
+            </a:r>
+          </a:p>
+          <a:p>
+            <a:pPr lvl="1"/>
+            <a:r>
+              <a:rPr lang="en-US" smtClean="0"/>
+              <a:t>Second level</a:t>
+            </a:r>
+          </a:p>
+          <a:p>
+            <a:pPr lvl="2"/>
+            <a:r>
+              <a:rPr lang="en-US" smtClean="0"/>
+              <a:t>Third level</a:t>
+            </a:r>
+          </a:p>
+          <a:p>
+            <a:pPr lvl="3"/>
+            <a:r>
+              <a:rPr lang="en-US" smtClean="0"/>
+              <a:t>Fourth level</a:t>
+            </a:r>
+          </a:p>
+          <a:p>
+            <a:pPr lvl="4"/>
+            <a:r>
+              <a:rPr lang="en-US" smtClean="0"/>
+              <a:t>Fifth level</a:t>
+            </a:r>
+            <a:endParaRPr lang="en-US"/>
+          </a:p>
+        </p:txBody>
+      </p:sp>
+      <p:sp>
+        <p:nvSpPr>
+          <p:cNvPr id="6" name="Footer Placeholder 5"/>
+          <p:cNvSpPr>
+            <a:spLocks noGrp="1"/>
+          </p:cNvSpPr>
+          <p:nvPr>
+            <p:ph type="ftr" sz="quarter" idx="4"/>
+          </p:nvPr>
+        </p:nvSpPr>
+        <p:spPr>
+          <a:xfrm>
+            <a:off x="0" y="8685213"/>
+            <a:ext cx="2971800" cy="458787"/>
+          </a:xfrm>
+          <a:prstGeom prst="rect">
+            <a:avLst/>
+          </a:prstGeom>
+        </p:spPr>
+        <p:txBody>
+          <a:bodyPr vert="horz" lIns="91440" tIns="45720" rIns="91440" bIns="45720" rtlCol="0" anchor="b"/>
+          <a:lstStyle>
+            <a:lvl1pPr algn="l">
+              <a:defRPr sz="1200"/>
+            </a:lvl1pPr>
+          </a:lstStyle>
+          <a:p>
+            <a:endParaRPr lang="en-US"/>
+          </a:p>
+        </p:txBody>
+      </p:sp>
+      <p:sp>
+        <p:nvSpPr>
+          <p:cNvPr id="7" name="Slide Number Placeholder 6"/>
+          <p:cNvSpPr>
+            <a:spLocks noGrp="1"/>
+          </p:cNvSpPr>
+          <p:nvPr>
+            <p:ph type="sldNum" sz="quarter" idx="5"/>
+          </p:nvPr>
+        </p:nvSpPr>
+        <p:spPr>
+          <a:xfrm>
+            <a:off x="3884613" y="8685213"/>
+            <a:ext cx="2971800" cy="458787"/>
+          </a:xfrm>
+          <a:prstGeom prst="rect">
+            <a:avLst/>
+          </a:prstGeom>
+        </p:spPr>
+        <p:txBody>
+          <a:bodyPr vert="horz" lIns="91440" tIns="45720" rIns="91440" bIns="45720" rtlCol="0" anchor="b"/>
+          <a:lstStyle>
+            <a:lvl1pPr algn="r">
+              <a:defRPr sz="1200"/>
+            </a:lvl1pPr>
+          </a:lstStyle>
+          <a:p>
+            <a:fld id="{9212CE40-3A97-4FC7-B837-2C606E3BE021}" type="slidenum">
+              <a:rPr lang="en-US" smtClean="0"/>
+              <a:t>‹#›</a:t>
+            </a:fld>
+            <a:endParaRPr lang="en-US"/>
+          </a:p>
+        </p:txBody>
+      </p:sp>
+    </p:spTree>
+    <p:extLst>
+      <p:ext uri="{BB962C8B-B14F-4D97-AF65-F5344CB8AC3E}">
+        <p14:creationId xmlns:p14="http://schemas.microsoft.com/office/powerpoint/2010/main" val="1255537885"/>
+      </p:ext>
+    </p:extLst>
+  </p:cSld>
+  <p:clrMap bg1="lt1" tx1="dk1" bg2="lt2" tx2="dk2" accent1="accent1" accent2="accent2" accent3="accent3" accent4="accent4" accent5="accent5" accent6="accent6" hlink="hlink" folHlink="folHlink"/>
+  <p:notesStyle>
+    <a:lvl1pPr marL="0" algn="l" defTabSz="914400" rtl="0" eaLnBrk="1" latinLnBrk="0" hangingPunct="1">
+      <a:defRPr sz="1200" kern="1200">
+        <a:solidFill>
+          <a:schemeClr val="tx1"/>
+        </a:solidFill>
+        <a:latin typeface="+mn-lt"/>
+        <a:ea typeface="+mn-ea"/>
+        <a:cs typeface="+mn-cs"/>
+      </a:defRPr>
+    </a:lvl1pPr>
+    <a:lvl2pPr marL="457200" algn="l" defTabSz="914400" rtl="0" eaLnBrk="1" latinLnBrk="0" hangingPunct="1">
+      <a:defRPr sz="1200" kern="1200">
+        <a:solidFill>
+          <a:schemeClr val="tx1"/>
+        </a:solidFill>
+        <a:latin typeface="+mn-lt"/>
+        <a:ea typeface="+mn-ea"/>
+        <a:cs typeface="+mn-cs"/>
+      </a:defRPr>
+    </a:lvl2pPr>
+    <a:lvl3pPr marL="914400" algn="l" defTabSz="914400" rtl="0" eaLnBrk="1" latinLnBrk="0" hangingPunct="1">
+      <a:defRPr sz="1200" kern="1200">
+        <a:solidFill>
+          <a:schemeClr val="tx1"/>
+        </a:solidFill>
+        <a:latin typeface="+mn-lt"/>
+        <a:ea typeface="+mn-ea"/>
+        <a:cs typeface="+mn-cs"/>
+      </a:defRPr>
+    </a:lvl3pPr>
+    <a:lvl4pPr marL="1371600" algn="l" defTabSz="914400" rtl="0" eaLnBrk="1" latinLnBrk="0" hangingPunct="1">
+      <a:defRPr sz="1200" kern="1200">
+        <a:solidFill>
+          <a:schemeClr val="tx1"/>
+        </a:solidFill>
+        <a:latin typeface="+mn-lt"/>
+        <a:ea typeface="+mn-ea"/>
+        <a:cs typeface="+mn-cs"/>
+      </a:defRPr>
+    </a:lvl4pPr>
+    <a:lvl5pPr marL="1828800" algn="l" defTabSz="914400" rtl="0" eaLnBrk="1" latinLnBrk="0" hangingPunct="1">
+      <a:defRPr sz="1200" kern="1200">
+        <a:solidFill>
+          <a:schemeClr val="tx1"/>
+        </a:solidFill>
+        <a:latin typeface="+mn-lt"/>
+        <a:ea typeface="+mn-ea"/>
+        <a:cs typeface="+mn-cs"/>
+      </a:defRPr>
+    </a:lvl5pPr>
+    <a:lvl6pPr marL="2286000" algn="l" defTabSz="914400" rtl="0" eaLnBrk="1" latinLnBrk="0" hangingPunct="1">
+      <a:defRPr sz="1200" kern="1200">
+        <a:solidFill>
+          <a:schemeClr val="tx1"/>
+        </a:solidFill>
+        <a:latin typeface="+mn-lt"/>
+        <a:ea typeface="+mn-ea"/>
+        <a:cs typeface="+mn-cs"/>
+      </a:defRPr>
+    </a:lvl6pPr>
+    <a:lvl7pPr marL="2743200" algn="l" defTabSz="914400" rtl="0" eaLnBrk="1" latinLnBrk="0" hangingPunct="1">
+      <a:defRPr sz="1200" kern="1200">
+        <a:solidFill>
+          <a:schemeClr val="tx1"/>
+        </a:solidFill>
+        <a:latin typeface="+mn-lt"/>
+        <a:ea typeface="+mn-ea"/>
+        <a:cs typeface="+mn-cs"/>
+      </a:defRPr>
+    </a:lvl7pPr>
+    <a:lvl8pPr marL="3200400" algn="l" defTabSz="914400" rtl="0" eaLnBrk="1" latinLnBrk="0" hangingPunct="1">
+      <a:defRPr sz="1200" kern="1200">
+        <a:solidFill>
+          <a:schemeClr val="tx1"/>
+        </a:solidFill>
+        <a:latin typeface="+mn-lt"/>
+        <a:ea typeface="+mn-ea"/>
+        <a:cs typeface="+mn-cs"/>
+      </a:defRPr>
+    </a:lvl8pPr>
+    <a:lvl9pPr marL="3657600" algn="l" defTabSz="914400" rtl="0" eaLnBrk="1" latinLnBrk="0" hangingPunct="1">
+      <a:defRPr sz="1200" kern="1200">
+        <a:solidFill>
+          <a:schemeClr val="tx1"/>
+        </a:solidFill>
+        <a:latin typeface="+mn-lt"/>
+        <a:ea typeface="+mn-ea"/>
+        <a:cs typeface="+mn-cs"/>
+      </a:defRPr>
+    </a:lvl9pPr>
+  </p:notesStyle>
+</p:notesMaster>
+</file>
+
 <file path=ppt/slideLayouts/slideLayout1.xml><?xml version="1.0" encoding="utf-8"?>
 <p:sldLayout xmlns:a="http://schemas.openxmlformats.org/drawingml/2006/main" xmlns:r="http://schemas.openxmlformats.org/officeDocument/2006/relationships" xmlns:p="http://schemas.openxmlformats.org/presentationml/2006/main" type="title" preserve="1">
   <p:cSld name="Title Slide">
@@ -1032,35 +1385,6 @@
             <a:r>
               <a:rPr lang="en-US" dirty="0"/>
               <a:t>Illustrations, if appropriate, to support the prose.</a:t>
-            </a:r>
-          </a:p>
-        </p:txBody>
-      </p:sp>
-      <p:sp>
-        <p:nvSpPr>
-          <p:cNvPr id="2" name="TextBox 1"/>
-          <p:cNvSpPr txBox="1"/>
-          <p:nvPr userDrawn="1"/>
-        </p:nvSpPr>
-        <p:spPr>
-          <a:xfrm>
-            <a:off x="11419114" y="20574000"/>
-            <a:ext cx="20726400" cy="523220"/>
-          </a:xfrm>
-          <a:prstGeom prst="rect">
-            <a:avLst/>
-          </a:prstGeom>
-          <a:noFill/>
-        </p:spPr>
-        <p:txBody>
-          <a:bodyPr wrap="square" rtlCol="0">
-            <a:spAutoFit/>
-          </a:bodyPr>
-          <a:lstStyle/>
-          <a:p>
-            <a:r>
-              <a:rPr lang="en-US" sz="2800" dirty="0"/>
-              <a:t>Team role abbreviations: SM – Scrum Master; OP – Owner Proxy; QC – Quality Controller</a:t>
             </a:r>
           </a:p>
         </p:txBody>
@@ -3409,8 +3733,8 @@
         </p:nvSpPr>
         <p:spPr>
           <a:xfrm>
-            <a:off x="9715500" y="803565"/>
-            <a:ext cx="24003000" cy="3657600"/>
+            <a:off x="0" y="727454"/>
+            <a:ext cx="32918400" cy="3657600"/>
           </a:xfrm>
         </p:spPr>
         <p:txBody>
@@ -3419,6 +3743,7 @@
           </a:bodyPr>
           <a:lstStyle/>
           <a:p>
+            <a:pPr algn="ctr"/>
             <a:r>
               <a:rPr lang="en-US" sz="19900" dirty="0">
                 <a:solidFill>
@@ -3446,7 +3771,7 @@
         <p:spPr>
           <a:xfrm>
             <a:off x="762007" y="6324603"/>
-            <a:ext cx="14630393" cy="7823974"/>
+            <a:ext cx="15087593" cy="7823974"/>
           </a:xfrm>
         </p:spPr>
         <p:txBody>
@@ -3456,15 +3781,22 @@
           <a:lstStyle/>
           <a:p>
             <a:r>
+              <a:rPr lang="en-US" sz="4500" b="0" dirty="0" smtClean="0"/>
+              <a:t>Hotspotter is a web application used for early prediction of bugs in software. </a:t>
+            </a:r>
+          </a:p>
+          <a:p>
+            <a:r>
               <a:rPr lang="en-US" sz="4500" b="0" dirty="0"/>
-              <a:t>Hotspotter is a web application used for early prediction of bugs in software. </a:t>
-            </a:r>
-          </a:p>
-          <a:p>
-            <a:r>
-              <a:rPr lang="en-US" sz="4500" b="0" dirty="0"/>
-              <a:t>This is accomplished by detecting areas of instability called 'hotspots'. Hotspots are determined by analyzing the type and frequency of changes made to a project's codebase.</a:t>
-            </a:r>
+              <a:t>This is accomplished by detecting areas of instability called 'hotspots'. Hotspots are determined by analyzing the type and frequency of changes made to a project's codebase</a:t>
+            </a:r>
+            <a:r>
+              <a:rPr lang="en-US" sz="4500" b="0" dirty="0" smtClean="0"/>
+              <a:t>.</a:t>
+            </a:r>
+          </a:p>
+          <a:p>
+            <a:endParaRPr lang="en-US" sz="4500" b="0" dirty="0"/>
           </a:p>
           <a:p>
             <a:r>
@@ -3537,46 +3869,34 @@
           <a:lstStyle/>
           <a:p>
             <a:r>
-              <a:rPr lang="en-US" sz="4400" b="1" dirty="0"/>
+              <a:rPr lang="en-US" sz="4400" b="1" dirty="0" smtClean="0"/>
               <a:t>Nate Reinhardt</a:t>
             </a:r>
             <a:r>
-              <a:rPr lang="en-US" sz="4400" dirty="0"/>
+              <a:rPr lang="en-US" sz="4400" dirty="0" smtClean="0"/>
+              <a:t>,</a:t>
+            </a:r>
+            <a:r>
+              <a:rPr lang="en-US" b="1" dirty="0" smtClean="0"/>
               <a:t> </a:t>
             </a:r>
             <a:r>
-              <a:rPr lang="en-US" sz="3600" dirty="0"/>
-              <a:t>(SM)</a:t>
+              <a:rPr lang="en-US" sz="4400" b="1" dirty="0" smtClean="0"/>
+              <a:t>Spencer Smith</a:t>
             </a:r>
             <a:r>
               <a:rPr lang="en-US" dirty="0"/>
+              <a:t>,</a:t>
+            </a:r>
+            <a:r>
+              <a:rPr lang="en-US" sz="3600" b="1" dirty="0" smtClean="0"/>
               <a:t> </a:t>
             </a:r>
             <a:r>
-              <a:rPr lang="en-US" sz="4400" b="1" dirty="0"/>
-              <a:t>Spencer Smith</a:t>
-            </a:r>
-            <a:r>
-              <a:rPr lang="en-US" sz="4400" dirty="0"/>
-              <a:t> </a:t>
-            </a:r>
-            <a:r>
-              <a:rPr lang="en-US" sz="3600" dirty="0"/>
-              <a:t>(OP) </a:t>
-            </a:r>
-            <a:r>
-              <a:rPr lang="en-US" sz="4400" b="1" dirty="0"/>
+              <a:rPr lang="en-US" sz="4400" b="1" dirty="0" smtClean="0"/>
               <a:t>Dylan Williams</a:t>
             </a:r>
-            <a:r>
-              <a:rPr lang="en-US" sz="4400" dirty="0"/>
-              <a:t> </a:t>
-            </a:r>
-            <a:r>
-              <a:rPr lang="en-US" sz="3600" dirty="0"/>
-              <a:t>(QC)</a:t>
-            </a:r>
-            <a:endParaRPr lang="en-US" dirty="0"/>
+            <a:endParaRPr lang="en-US" b="1" dirty="0"/>
           </a:p>
         </p:txBody>
       </p:sp>
@@ -3626,94 +3946,201 @@
             </p:nvSpPr>
             <p:spPr>
               <a:xfrm>
-                <a:off x="762000" y="14148577"/>
-                <a:ext cx="14630400" cy="6219033"/>
+                <a:off x="762001" y="15382396"/>
+                <a:ext cx="14630400" cy="5653822"/>
               </a:xfrm>
             </p:spPr>
             <p:txBody>
               <a:bodyPr>
-                <a:normAutofit/>
+                <a:normAutofit fontScale="92500"/>
               </a:bodyPr>
               <a:lstStyle/>
               <a:p>
                 <a:r>
-                  <a:rPr lang="en-US" sz="4400" dirty="0"/>
+                  <a:rPr lang="en-US" sz="4500" dirty="0" smtClean="0"/>
                   <a:t>Scoring</a:t>
                 </a:r>
-              </a:p>
-              <a:p>
-                <a:pPr marL="571500" indent="-571500">
-                  <a:buFont typeface="Arial" panose="020B0604020202020204" pitchFamily="34" charset="0"/>
-                  <a:buChar char="•"/>
-                </a:pPr>
-                <a:r>
-                  <a:rPr lang="en-US" sz="4400" b="0"/>
-                  <a:t>Dynamic Metrics</a:t>
-                </a:r>
-                <a:endParaRPr lang="en-US" sz="4400" b="0" dirty="0"/>
+                <a:endParaRPr lang="en-US" sz="4400" b="0" i="1" dirty="0" smtClean="0">
+                  <a:latin typeface="Cambria Math" panose="02040503050406030204" pitchFamily="18" charset="0"/>
+                </a:endParaRPr>
               </a:p>
               <a:p>
                 <a:pPr marL="685800" indent="-685800">
                   <a:buFont typeface="Arial" panose="020B0604020202020204" pitchFamily="34" charset="0"/>
                   <a:buChar char="•"/>
                 </a:pPr>
-                <a14:m>
-                  <m:oMath xmlns:m="http://schemas.openxmlformats.org/officeDocument/2006/math">
-                    <m:r>
-                      <a:rPr lang="en-US" sz="4500" b="0" i="1">
-                        <a:latin typeface="Cambria Math" panose="02040503050406030204" pitchFamily="18" charset="0"/>
-                      </a:rPr>
-                      <m:t>1 / (1 + </m:t>
-                    </m:r>
-                    <m:sSup>
-                      <m:sSupPr>
-                        <m:ctrlPr>
-                          <a:rPr lang="en-US" sz="4500" b="0" i="1">
-                            <a:latin typeface="Cambria Math" panose="02040503050406030204" pitchFamily="18" charset="0"/>
-                          </a:rPr>
-                        </m:ctrlPr>
-                      </m:sSupPr>
-                      <m:e>
-                        <m:r>
-                          <a:rPr lang="en-US" sz="4500" b="0" i="1">
-                            <a:latin typeface="Cambria Math" panose="02040503050406030204" pitchFamily="18" charset="0"/>
-                          </a:rPr>
-                          <m:t>𝑒</m:t>
-                        </m:r>
-                      </m:e>
-                      <m:sup>
-                        <m:r>
-                          <a:rPr lang="en-US" sz="4500" b="0" i="1">
-                            <a:latin typeface="Cambria Math" panose="02040503050406030204" pitchFamily="18" charset="0"/>
-                          </a:rPr>
-                          <m:t>(−12</m:t>
-                        </m:r>
-                        <m:r>
-                          <a:rPr lang="en-US" sz="4500" b="0" i="1">
-                            <a:latin typeface="Cambria Math" panose="02040503050406030204" pitchFamily="18" charset="0"/>
-                          </a:rPr>
-                          <m:t>𝑡</m:t>
-                        </m:r>
-                        <m:r>
-                          <a:rPr lang="en-US" sz="4500" b="0" i="1">
-                            <a:latin typeface="Cambria Math" panose="02040503050406030204" pitchFamily="18" charset="0"/>
-                          </a:rPr>
-                          <m:t>+12)</m:t>
-                        </m:r>
-                      </m:sup>
-                    </m:sSup>
-                    <m:r>
-                      <a:rPr lang="en-US" sz="4500" b="0" i="1">
-                        <a:latin typeface="Cambria Math" panose="02040503050406030204" pitchFamily="18" charset="0"/>
-                      </a:rPr>
-                      <m:t>)</m:t>
-                    </m:r>
-                  </m:oMath>
-                </a14:m>
+                <a:r>
+                  <a:rPr lang="en-US" sz="4500" b="0" dirty="0" smtClean="0"/>
+                  <a:t>Original algorithm based on research from Google and Rahman, et al.</a:t>
+                </a:r>
                 <a:endParaRPr lang="en-US" sz="4500" b="0" dirty="0"/>
               </a:p>
               <a:p>
-                <a:endParaRPr lang="en-US" sz="4500" dirty="0"/>
+                <a14:m>
+                  <m:oMathPara xmlns:m="http://schemas.openxmlformats.org/officeDocument/2006/math">
+                    <m:oMathParaPr>
+                      <m:jc m:val="centerGroup"/>
+                    </m:oMathParaPr>
+                    <m:oMath xmlns:m="http://schemas.openxmlformats.org/officeDocument/2006/math">
+                      <m:r>
+                        <a:rPr lang="en-US" sz="4500" b="0" i="1" smtClean="0">
+                          <a:latin typeface="Cambria Math" panose="02040503050406030204" pitchFamily="18" charset="0"/>
+                        </a:rPr>
+                        <m:t>𝑆𝑐𝑜𝑟𝑒</m:t>
+                      </m:r>
+                      <m:r>
+                        <a:rPr lang="en-US" sz="4500" b="0" i="1" smtClean="0">
+                          <a:latin typeface="Cambria Math" panose="02040503050406030204" pitchFamily="18" charset="0"/>
+                        </a:rPr>
+                        <m:t>=</m:t>
+                      </m:r>
+                      <m:f>
+                        <m:fPr>
+                          <m:ctrlPr>
+                            <a:rPr lang="en-US" sz="4500" b="0" i="1" smtClean="0">
+                              <a:latin typeface="Cambria Math" panose="02040503050406030204" pitchFamily="18" charset="0"/>
+                            </a:rPr>
+                          </m:ctrlPr>
+                        </m:fPr>
+                        <m:num>
+                          <m:r>
+                            <a:rPr lang="en-US" sz="4500" b="0" i="1" smtClean="0">
+                              <a:latin typeface="Cambria Math" panose="02040503050406030204" pitchFamily="18" charset="0"/>
+                            </a:rPr>
+                            <m:t>1</m:t>
+                          </m:r>
+                        </m:num>
+                        <m:den>
+                          <m:r>
+                            <a:rPr lang="en-US" sz="4500" b="0" i="1" smtClean="0">
+                              <a:latin typeface="Cambria Math" panose="02040503050406030204" pitchFamily="18" charset="0"/>
+                            </a:rPr>
+                            <m:t>1+</m:t>
+                          </m:r>
+                          <m:sSup>
+                            <m:sSupPr>
+                              <m:ctrlPr>
+                                <a:rPr lang="en-US" sz="4500" b="0" i="1" smtClean="0">
+                                  <a:latin typeface="Cambria Math" panose="02040503050406030204" pitchFamily="18" charset="0"/>
+                                </a:rPr>
+                              </m:ctrlPr>
+                            </m:sSupPr>
+                            <m:e>
+                              <m:r>
+                                <a:rPr lang="en-US" sz="4500" b="0" i="1" smtClean="0">
+                                  <a:latin typeface="Cambria Math" panose="02040503050406030204" pitchFamily="18" charset="0"/>
+                                </a:rPr>
+                                <m:t>𝑒</m:t>
+                              </m:r>
+                            </m:e>
+                            <m:sup>
+                              <m:r>
+                                <a:rPr lang="en-US" sz="4500" b="0" i="1" smtClean="0">
+                                  <a:latin typeface="Cambria Math" panose="02040503050406030204" pitchFamily="18" charset="0"/>
+                                </a:rPr>
+                                <m:t>−12</m:t>
+                              </m:r>
+                              <m:r>
+                                <a:rPr lang="en-US" sz="4500" b="0" i="1" smtClean="0">
+                                  <a:latin typeface="Cambria Math" panose="02040503050406030204" pitchFamily="18" charset="0"/>
+                                </a:rPr>
+                                <m:t>𝑡</m:t>
+                              </m:r>
+                              <m:r>
+                                <a:rPr lang="en-US" sz="4500" b="0" i="1" smtClean="0">
+                                  <a:latin typeface="Cambria Math" panose="02040503050406030204" pitchFamily="18" charset="0"/>
+                                </a:rPr>
+                                <m:t>+12</m:t>
+                              </m:r>
+                            </m:sup>
+                          </m:sSup>
+                        </m:den>
+                      </m:f>
+                    </m:oMath>
+                  </m:oMathPara>
+                </a14:m>
+                <a:endParaRPr lang="en-US" sz="4500" b="0" dirty="0" smtClean="0"/>
+              </a:p>
+              <a:p>
+                <a:r>
+                  <a:rPr lang="en-US" sz="3000" b="0" dirty="0"/>
+                  <a:t>Lewis, Chris, and </a:t>
+                </a:r>
+                <a:r>
+                  <a:rPr lang="en-US" sz="3000" b="0" dirty="0" err="1"/>
+                  <a:t>Rong</a:t>
+                </a:r>
+                <a:r>
+                  <a:rPr lang="en-US" sz="3000" b="0" dirty="0"/>
+                  <a:t> </a:t>
+                </a:r>
+                <a:r>
+                  <a:rPr lang="en-US" sz="3000" b="0" dirty="0" err="1"/>
+                  <a:t>Ou</a:t>
+                </a:r>
+                <a:r>
+                  <a:rPr lang="en-US" sz="3000" b="0" dirty="0"/>
+                  <a:t>. "Bug Prediction at Google." </a:t>
+                </a:r>
+                <a:r>
+                  <a:rPr lang="en-US" sz="3000" b="0" i="1" dirty="0"/>
+                  <a:t>Bug Prediction at Google</a:t>
+                </a:r>
+                <a:r>
+                  <a:rPr lang="en-US" sz="3000" b="0" dirty="0"/>
+                  <a:t>. </a:t>
+                </a:r>
+                <a:r>
+                  <a:rPr lang="en-US" sz="3000" b="0" dirty="0" smtClean="0"/>
+                  <a:t>14 </a:t>
+                </a:r>
+                <a:r>
+                  <a:rPr lang="en-US" sz="3000" b="0" dirty="0"/>
+                  <a:t>Dec. 2011</a:t>
+                </a:r>
+                <a:r>
+                  <a:rPr lang="en-US" sz="3000" b="0" dirty="0" smtClean="0"/>
+                  <a:t>. </a:t>
+                </a:r>
+              </a:p>
+              <a:p>
+                <a:r>
+                  <a:rPr lang="en-US" sz="3000" b="0" dirty="0"/>
+                  <a:t>Rahman, </a:t>
+                </a:r>
+                <a:r>
+                  <a:rPr lang="en-US" sz="3000" b="0" dirty="0" err="1"/>
+                  <a:t>Foyzur</a:t>
+                </a:r>
+                <a:r>
+                  <a:rPr lang="en-US" sz="3000" b="0" dirty="0"/>
+                  <a:t>, et al. "</a:t>
+                </a:r>
+                <a:r>
+                  <a:rPr lang="en-US" sz="3000" b="0" dirty="0" err="1"/>
+                  <a:t>BugCache</a:t>
+                </a:r>
+                <a:r>
+                  <a:rPr lang="en-US" sz="3000" b="0" dirty="0"/>
+                  <a:t> for inspections: hit or </a:t>
+                </a:r>
+                <a:r>
+                  <a:rPr lang="en-US" sz="3000" b="0" dirty="0" err="1"/>
+                  <a:t>miss?."</a:t>
+                </a:r>
+                <a:r>
+                  <a:rPr lang="en-US" sz="3000" b="0" i="1" dirty="0" err="1"/>
+                  <a:t>Proceedings</a:t>
+                </a:r>
+                <a:r>
+                  <a:rPr lang="en-US" sz="3000" b="0" i="1" dirty="0"/>
+                  <a:t> of the 19th ACM SIGSOFT symposium and the 13th European conference on Foundations of software engineering</a:t>
+                </a:r>
+                <a:r>
+                  <a:rPr lang="en-US" sz="3000" b="0" dirty="0"/>
+                  <a:t>. ACM, 2011.</a:t>
+                </a:r>
+                <a:endParaRPr lang="en-US" sz="3000" b="0" dirty="0"/>
               </a:p>
             </p:txBody>
           </p:sp>
@@ -3731,13 +4158,13 @@
             </p:nvSpPr>
             <p:spPr>
               <a:xfrm>
-                <a:off x="762000" y="14148577"/>
-                <a:ext cx="14630400" cy="6219033"/>
+                <a:off x="762001" y="15382396"/>
+                <a:ext cx="14630400" cy="5653822"/>
               </a:xfrm>
-              <a:blipFill>
+              <a:blipFill rotWithShape="0">
                 <a:blip r:embed="rId2"/>
                 <a:stretch>
-                  <a:fillRect l="-1667" t="-3137"/>
+                  <a:fillRect l="-1583" t="-3125"/>
                 </a:stretch>
               </a:blipFill>
             </p:spPr>
@@ -3756,160 +4183,6 @@
           </p:sp>
         </mc:Fallback>
       </mc:AlternateContent>
-      <p:sp>
-        <p:nvSpPr>
-          <p:cNvPr id="3" name="TextBox 2"/>
-          <p:cNvSpPr txBox="1"/>
-          <p:nvPr/>
-        </p:nvSpPr>
-        <p:spPr>
-          <a:xfrm rot="721562">
-            <a:off x="1555576" y="1702376"/>
-            <a:ext cx="5867399" cy="1046396"/>
-          </a:xfrm>
-          <a:prstGeom prst="rect">
-            <a:avLst/>
-          </a:prstGeom>
-          <a:noFill/>
-        </p:spPr>
-        <p:txBody>
-          <a:bodyPr wrap="square" lIns="91394" tIns="45698" rIns="91394" bIns="45698" rtlCol="0">
-            <a:spAutoFit/>
-          </a:bodyPr>
-          <a:lstStyle/>
-          <a:p>
-            <a:r>
-              <a:rPr lang="en-US" dirty="0">
-                <a:solidFill>
-                  <a:schemeClr val="bg1">
-                    <a:lumMod val="75000"/>
-                  </a:schemeClr>
-                </a:solidFill>
-              </a:rPr>
-              <a:t>Temporary Logo</a:t>
-            </a:r>
-          </a:p>
-        </p:txBody>
-      </p:sp>
-      <p:pic>
-        <p:nvPicPr>
-          <p:cNvPr id="13" name="Picture 12"/>
-          <p:cNvPicPr>
-            <a:picLocks noChangeAspect="1"/>
-          </p:cNvPicPr>
-          <p:nvPr/>
-        </p:nvPicPr>
-        <p:blipFill>
-          <a:blip r:embed="rId3">
-            <a:extLst>
-              <a:ext uri="{28A0092B-C50C-407E-A947-70E740481C1C}">
-                <a14:useLocalDpi xmlns:a14="http://schemas.microsoft.com/office/drawing/2010/main" val="0"/>
-              </a:ext>
-            </a:extLst>
-          </a:blip>
-          <a:stretch>
-            <a:fillRect/>
-          </a:stretch>
-        </p:blipFill>
-        <p:spPr>
-          <a:xfrm>
-            <a:off x="1478293" y="19270884"/>
-            <a:ext cx="3721680" cy="1096726"/>
-          </a:xfrm>
-          <a:prstGeom prst="rect">
-            <a:avLst/>
-          </a:prstGeom>
-        </p:spPr>
-      </p:pic>
-      <p:pic>
-        <p:nvPicPr>
-          <p:cNvPr id="14" name="Picture 13"/>
-          <p:cNvPicPr>
-            <a:picLocks noChangeAspect="1"/>
-          </p:cNvPicPr>
-          <p:nvPr/>
-        </p:nvPicPr>
-        <p:blipFill rotWithShape="1">
-          <a:blip r:embed="rId4">
-            <a:extLst>
-              <a:ext uri="{28A0092B-C50C-407E-A947-70E740481C1C}">
-                <a14:useLocalDpi xmlns:a14="http://schemas.microsoft.com/office/drawing/2010/main" val="0"/>
-              </a:ext>
-            </a:extLst>
-          </a:blip>
-          <a:srcRect l="4394" r="10035" b="1890"/>
-          <a:stretch/>
-        </p:blipFill>
-        <p:spPr>
-          <a:xfrm>
-            <a:off x="5405270" y="19418811"/>
-            <a:ext cx="3289709" cy="1037177"/>
-          </a:xfrm>
-          <a:prstGeom prst="rect">
-            <a:avLst/>
-          </a:prstGeom>
-        </p:spPr>
-      </p:pic>
-      <p:pic>
-        <p:nvPicPr>
-          <p:cNvPr id="15" name="Picture 14"/>
-          <p:cNvPicPr>
-            <a:picLocks noChangeAspect="1"/>
-          </p:cNvPicPr>
-          <p:nvPr/>
-        </p:nvPicPr>
-        <p:blipFill>
-          <a:blip r:embed="rId5">
-            <a:extLst>
-              <a:ext uri="{28A0092B-C50C-407E-A947-70E740481C1C}">
-                <a14:useLocalDpi xmlns:a14="http://schemas.microsoft.com/office/drawing/2010/main" val="0"/>
-              </a:ext>
-            </a:extLst>
-          </a:blip>
-          <a:stretch>
-            <a:fillRect/>
-          </a:stretch>
-        </p:blipFill>
-        <p:spPr>
-          <a:xfrm>
-            <a:off x="8900276" y="19507200"/>
-            <a:ext cx="3233956" cy="860410"/>
-          </a:xfrm>
-          <a:prstGeom prst="rect">
-            <a:avLst/>
-          </a:prstGeom>
-        </p:spPr>
-      </p:pic>
-      <p:pic>
-        <p:nvPicPr>
-          <p:cNvPr id="16" name="Picture 15"/>
-          <p:cNvPicPr>
-            <a:picLocks noChangeAspect="1"/>
-          </p:cNvPicPr>
-          <p:nvPr/>
-        </p:nvPicPr>
-        <p:blipFill>
-          <a:blip r:embed="rId6">
-            <a:extLst>
-              <a:ext uri="{28A0092B-C50C-407E-A947-70E740481C1C}">
-                <a14:useLocalDpi xmlns:a14="http://schemas.microsoft.com/office/drawing/2010/main" val="0"/>
-              </a:ext>
-            </a:extLst>
-          </a:blip>
-          <a:stretch>
-            <a:fillRect/>
-          </a:stretch>
-        </p:blipFill>
-        <p:spPr>
-          <a:xfrm>
-            <a:off x="12339530" y="19319817"/>
-            <a:ext cx="3637094" cy="1175437"/>
-          </a:xfrm>
-          <a:prstGeom prst="rect">
-            <a:avLst/>
-          </a:prstGeom>
-        </p:spPr>
-      </p:pic>
       <p:pic>
         <p:nvPicPr>
           <p:cNvPr id="10" name="Picture Placeholder 9"/>
@@ -3921,7 +4194,7 @@
           </p:nvPr>
         </p:nvPicPr>
         <p:blipFill>
-          <a:blip r:embed="rId7">
+          <a:blip r:embed="rId3">
             <a:extLst>
               <a:ext uri="{28A0092B-C50C-407E-A947-70E740481C1C}">
                 <a14:useLocalDpi xmlns:a14="http://schemas.microsoft.com/office/drawing/2010/main" val="0"/>
@@ -3935,8 +4208,8 @@
         </p:blipFill>
         <p:spPr>
           <a:xfrm>
-            <a:off x="762000" y="379311"/>
-            <a:ext cx="7772400" cy="3692525"/>
+            <a:off x="3352800" y="727454"/>
+            <a:ext cx="6249940" cy="2969232"/>
           </a:xfrm>
         </p:spPr>
       </p:pic>
@@ -3949,15 +4222,39 @@
           <p:nvPr/>
         </p:nvPicPr>
         <p:blipFill>
-          <a:blip r:embed="rId8"/>
+          <a:blip r:embed="rId4"/>
           <a:stretch>
             <a:fillRect/>
           </a:stretch>
         </p:blipFill>
         <p:spPr>
           <a:xfrm>
-            <a:off x="10517254" y="13497417"/>
-            <a:ext cx="13748046" cy="5822400"/>
+            <a:off x="15425501" y="14534179"/>
+            <a:ext cx="17492899" cy="7408373"/>
+          </a:xfrm>
+          <a:prstGeom prst="rect">
+            <a:avLst/>
+          </a:prstGeom>
+        </p:spPr>
+      </p:pic>
+      <p:pic>
+        <p:nvPicPr>
+          <p:cNvPr id="2" name="Picture 1"/>
+          <p:cNvPicPr>
+            <a:picLocks noChangeAspect="1"/>
+          </p:cNvPicPr>
+          <p:nvPr/>
+        </p:nvPicPr>
+        <p:blipFill>
+          <a:blip r:embed="rId5"/>
+          <a:stretch>
+            <a:fillRect/>
+          </a:stretch>
+        </p:blipFill>
+        <p:spPr>
+          <a:xfrm>
+            <a:off x="15425501" y="7670485"/>
+            <a:ext cx="10225475" cy="5815183"/>
           </a:xfrm>
           <a:prstGeom prst="rect">
             <a:avLst/>
@@ -3973,15 +4270,15 @@
           <p:nvPr/>
         </p:nvPicPr>
         <p:blipFill>
-          <a:blip r:embed="rId9"/>
+          <a:blip r:embed="rId6"/>
           <a:stretch>
             <a:fillRect/>
           </a:stretch>
         </p:blipFill>
         <p:spPr>
           <a:xfrm>
-            <a:off x="15976624" y="6284224"/>
-            <a:ext cx="6848422" cy="7180536"/>
+            <a:off x="25650976" y="6321555"/>
+            <a:ext cx="7264376" cy="7616662"/>
           </a:xfrm>
           <a:prstGeom prst="rect">
             <a:avLst/>
@@ -3998,6 +4295,13 @@
   <p:clrMapOvr>
     <a:masterClrMapping/>
   </p:clrMapOvr>
+  <p:timing>
+    <p:tnLst>
+      <p:par>
+        <p:cTn id="1" dur="indefinite" restart="never" nodeType="tmRoot"/>
+      </p:par>
+    </p:tnLst>
+  </p:timing>
 </p:sld>
 </file>
 
@@ -4294,4 +4598,265 @@
     </a:ext>
   </a:extLst>
 </a:theme>
+</file>
+
+<file path=ppt/theme/theme2.xml><?xml version="1.0" encoding="utf-8"?>
+<a:theme xmlns:a="http://schemas.openxmlformats.org/drawingml/2006/main" name="Office Theme">
+  <a:themeElements>
+    <a:clrScheme name="Office">
+      <a:dk1>
+        <a:sysClr val="windowText" lastClr="000000"/>
+      </a:dk1>
+      <a:lt1>
+        <a:sysClr val="window" lastClr="FFFFFF"/>
+      </a:lt1>
+      <a:dk2>
+        <a:srgbClr val="44546A"/>
+      </a:dk2>
+      <a:lt2>
+        <a:srgbClr val="E7E6E6"/>
+      </a:lt2>
+      <a:accent1>
+        <a:srgbClr val="5B9BD5"/>
+      </a:accent1>
+      <a:accent2>
+        <a:srgbClr val="ED7D31"/>
+      </a:accent2>
+      <a:accent3>
+        <a:srgbClr val="A5A5A5"/>
+      </a:accent3>
+      <a:accent4>
+        <a:srgbClr val="FFC000"/>
+      </a:accent4>
+      <a:accent5>
+        <a:srgbClr val="4472C4"/>
+      </a:accent5>
+      <a:accent6>
+        <a:srgbClr val="70AD47"/>
+      </a:accent6>
+      <a:hlink>
+        <a:srgbClr val="0563C1"/>
+      </a:hlink>
+      <a:folHlink>
+        <a:srgbClr val="954F72"/>
+      </a:folHlink>
+    </a:clrScheme>
+    <a:fontScheme name="Office">
+      <a:majorFont>
+        <a:latin typeface="Calibri Light" panose="020F0302020204030204"/>
+        <a:ea typeface=""/>
+        <a:cs typeface=""/>
+        <a:font script="Jpan" typeface="ＭＳ Ｐゴシック"/>
+        <a:font script="Hang" typeface="맑은 고딕"/>
+        <a:font script="Hans" typeface="宋体"/>
+        <a:font script="Hant" typeface="新細明體"/>
+        <a:font script="Arab" typeface="Times New Roman"/>
+        <a:font script="Hebr" typeface="Times New Roman"/>
+        <a:font script="Thai" typeface="Angsana New"/>
+        <a:font script="Ethi" typeface="Nyala"/>
+        <a:font script="Beng" typeface="Vrinda"/>
+        <a:font script="Gujr" typeface="Shruti"/>
+        <a:font script="Khmr" typeface="MoolBoran"/>
+        <a:font script="Knda" typeface="Tunga"/>
+        <a:font script="Guru" typeface="Raavi"/>
+        <a:font script="Cans" typeface="Euphemia"/>
+        <a:font script="Cher" typeface="Plantagenet Cherokee"/>
+        <a:font script="Yiii" typeface="Microsoft Yi Baiti"/>
+        <a:font script="Tibt" typeface="Microsoft Himalaya"/>
+        <a:font script="Thaa" typeface="MV Boli"/>
+        <a:font script="Deva" typeface="Mangal"/>
+        <a:font script="Telu" typeface="Gautami"/>
+        <a:font script="Taml" typeface="Latha"/>
+        <a:font script="Syrc" typeface="Estrangelo Edessa"/>
+        <a:font script="Orya" typeface="Kalinga"/>
+        <a:font script="Mlym" typeface="Kartika"/>
+        <a:font script="Laoo" typeface="DokChampa"/>
+        <a:font script="Sinh" typeface="Iskoola Pota"/>
+        <a:font script="Mong" typeface="Mongolian Baiti"/>
+        <a:font script="Viet" typeface="Times New Roman"/>
+        <a:font script="Uigh" typeface="Microsoft Uighur"/>
+        <a:font script="Geor" typeface="Sylfaen"/>
+      </a:majorFont>
+      <a:minorFont>
+        <a:latin typeface="Calibri" panose="020F0502020204030204"/>
+        <a:ea typeface=""/>
+        <a:cs typeface=""/>
+        <a:font script="Jpan" typeface="ＭＳ Ｐゴシック"/>
+        <a:font script="Hang" typeface="맑은 고딕"/>
+        <a:font script="Hans" typeface="宋体"/>
+        <a:font script="Hant" typeface="新細明體"/>
+        <a:font script="Arab" typeface="Arial"/>
+        <a:font script="Hebr" typeface="Arial"/>
+        <a:font script="Thai" typeface="Cordia New"/>
+        <a:font script="Ethi" typeface="Nyala"/>
+        <a:font script="Beng" typeface="Vrinda"/>
+        <a:font script="Gujr" typeface="Shruti"/>
+        <a:font script="Khmr" typeface="DaunPenh"/>
+        <a:font script="Knda" typeface="Tunga"/>
+        <a:font script="Guru" typeface="Raavi"/>
+        <a:font script="Cans" typeface="Euphemia"/>
+        <a:font script="Cher" typeface="Plantagenet Cherokee"/>
+        <a:font script="Yiii" typeface="Microsoft Yi Baiti"/>
+        <a:font script="Tibt" typeface="Microsoft Himalaya"/>
+        <a:font script="Thaa" typeface="MV Boli"/>
+        <a:font script="Deva" typeface="Mangal"/>
+        <a:font script="Telu" typeface="Gautami"/>
+        <a:font script="Taml" typeface="Latha"/>
+        <a:font script="Syrc" typeface="Estrangelo Edessa"/>
+        <a:font script="Orya" typeface="Kalinga"/>
+        <a:font script="Mlym" typeface="Kartika"/>
+        <a:font script="Laoo" typeface="DokChampa"/>
+        <a:font script="Sinh" typeface="Iskoola Pota"/>
+        <a:font script="Mong" typeface="Mongolian Baiti"/>
+        <a:font script="Viet" typeface="Arial"/>
+        <a:font script="Uigh" typeface="Microsoft Uighur"/>
+        <a:font script="Geor" typeface="Sylfaen"/>
+      </a:minorFont>
+    </a:fontScheme>
+    <a:fmtScheme name="Office">
+      <a:fillStyleLst>
+        <a:solidFill>
+          <a:schemeClr val="phClr"/>
+        </a:solidFill>
+        <a:gradFill rotWithShape="1">
+          <a:gsLst>
+            <a:gs pos="0">
+              <a:schemeClr val="phClr">
+                <a:lumMod val="110000"/>
+                <a:satMod val="105000"/>
+                <a:tint val="67000"/>
+              </a:schemeClr>
+            </a:gs>
+            <a:gs pos="50000">
+              <a:schemeClr val="phClr">
+                <a:lumMod val="105000"/>
+                <a:satMod val="103000"/>
+                <a:tint val="73000"/>
+              </a:schemeClr>
+            </a:gs>
+            <a:gs pos="100000">
+              <a:schemeClr val="phClr">
+                <a:lumMod val="105000"/>
+                <a:satMod val="109000"/>
+                <a:tint val="81000"/>
+              </a:schemeClr>
+            </a:gs>
+          </a:gsLst>
+          <a:lin ang="5400000" scaled="0"/>
+        </a:gradFill>
+        <a:gradFill rotWithShape="1">
+          <a:gsLst>
+            <a:gs pos="0">
+              <a:schemeClr val="phClr">
+                <a:satMod val="103000"/>
+                <a:lumMod val="102000"/>
+                <a:tint val="94000"/>
+              </a:schemeClr>
+            </a:gs>
+            <a:gs pos="50000">
+              <a:schemeClr val="phClr">
+                <a:satMod val="110000"/>
+                <a:lumMod val="100000"/>
+                <a:shade val="100000"/>
+              </a:schemeClr>
+            </a:gs>
+            <a:gs pos="100000">
+              <a:schemeClr val="phClr">
+                <a:lumMod val="99000"/>
+                <a:satMod val="120000"/>
+                <a:shade val="78000"/>
+              </a:schemeClr>
+            </a:gs>
+          </a:gsLst>
+          <a:lin ang="5400000" scaled="0"/>
+        </a:gradFill>
+      </a:fillStyleLst>
+      <a:lnStyleLst>
+        <a:ln w="6350" cap="flat" cmpd="sng" algn="ctr">
+          <a:solidFill>
+            <a:schemeClr val="phClr"/>
+          </a:solidFill>
+          <a:prstDash val="solid"/>
+          <a:miter lim="800000"/>
+        </a:ln>
+        <a:ln w="12700" cap="flat" cmpd="sng" algn="ctr">
+          <a:solidFill>
+            <a:schemeClr val="phClr"/>
+          </a:solidFill>
+          <a:prstDash val="solid"/>
+          <a:miter lim="800000"/>
+        </a:ln>
+        <a:ln w="19050" cap="flat" cmpd="sng" algn="ctr">
+          <a:solidFill>
+            <a:schemeClr val="phClr"/>
+          </a:solidFill>
+          <a:prstDash val="solid"/>
+          <a:miter lim="800000"/>
+        </a:ln>
+      </a:lnStyleLst>
+      <a:effectStyleLst>
+        <a:effectStyle>
+          <a:effectLst/>
+        </a:effectStyle>
+        <a:effectStyle>
+          <a:effectLst/>
+        </a:effectStyle>
+        <a:effectStyle>
+          <a:effectLst>
+            <a:outerShdw blurRad="57150" dist="19050" dir="5400000" algn="ctr" rotWithShape="0">
+              <a:srgbClr val="000000">
+                <a:alpha val="63000"/>
+              </a:srgbClr>
+            </a:outerShdw>
+          </a:effectLst>
+        </a:effectStyle>
+      </a:effectStyleLst>
+      <a:bgFillStyleLst>
+        <a:solidFill>
+          <a:schemeClr val="phClr"/>
+        </a:solidFill>
+        <a:solidFill>
+          <a:schemeClr val="phClr">
+            <a:tint val="95000"/>
+            <a:satMod val="170000"/>
+          </a:schemeClr>
+        </a:solidFill>
+        <a:gradFill rotWithShape="1">
+          <a:gsLst>
+            <a:gs pos="0">
+              <a:schemeClr val="phClr">
+                <a:tint val="93000"/>
+                <a:satMod val="150000"/>
+                <a:shade val="98000"/>
+                <a:lumMod val="102000"/>
+              </a:schemeClr>
+            </a:gs>
+            <a:gs pos="50000">
+              <a:schemeClr val="phClr">
+                <a:tint val="98000"/>
+                <a:satMod val="130000"/>
+                <a:shade val="90000"/>
+                <a:lumMod val="103000"/>
+              </a:schemeClr>
+            </a:gs>
+            <a:gs pos="100000">
+              <a:schemeClr val="phClr">
+                <a:shade val="63000"/>
+                <a:satMod val="120000"/>
+              </a:schemeClr>
+            </a:gs>
+          </a:gsLst>
+          <a:lin ang="5400000" scaled="0"/>
+        </a:gradFill>
+      </a:bgFillStyleLst>
+    </a:fmtScheme>
+  </a:themeElements>
+  <a:objectDefaults/>
+  <a:extraClrSchemeLst/>
+  <a:extLst>
+    <a:ext uri="{05A4C25C-085E-4340-85A3-A5531E510DB2}">
+      <thm15:themeFamily xmlns:thm15="http://schemas.microsoft.com/office/thememl/2012/main" name="Office Theme" id="{62F939B6-93AF-4DB8-9C6B-D6C7DFDC589F}" vid="{4A3C46E8-61CC-4603-A589-7422A47A8E4A}"/>
+    </a:ext>
+  </a:extLst>
+</a:theme>
 </file>
</xml_diff>